<commit_message>
Prensentacion apartado cuatro, terminar apartado uno
</commit_message>
<xml_diff>
--- a/04_flow_events/04_flow_events.pptx
+++ b/04_flow_events/04_flow_events.pptx
@@ -7,7 +7,7 @@
     <p:sldMasterId id="2147483671" r:id="rId4"/>
   </p:sldMasterIdLst>
   <p:notesMasterIdLst>
-    <p:notesMasterId r:id="rId19"/>
+    <p:notesMasterId r:id="rId28"/>
   </p:notesMasterIdLst>
   <p:sldIdLst>
     <p:sldId id="522" r:id="rId5"/>
@@ -19,11 +19,20 @@
     <p:sldId id="517" r:id="rId11"/>
     <p:sldId id="525" r:id="rId12"/>
     <p:sldId id="519" r:id="rId13"/>
-    <p:sldId id="520" r:id="rId14"/>
-    <p:sldId id="536" r:id="rId15"/>
-    <p:sldId id="518" r:id="rId16"/>
-    <p:sldId id="465" r:id="rId17"/>
-    <p:sldId id="464" r:id="rId18"/>
+    <p:sldId id="546" r:id="rId14"/>
+    <p:sldId id="543" r:id="rId15"/>
+    <p:sldId id="545" r:id="rId16"/>
+    <p:sldId id="547" r:id="rId17"/>
+    <p:sldId id="542" r:id="rId18"/>
+    <p:sldId id="520" r:id="rId19"/>
+    <p:sldId id="536" r:id="rId20"/>
+    <p:sldId id="548" r:id="rId21"/>
+    <p:sldId id="518" r:id="rId22"/>
+    <p:sldId id="550" r:id="rId23"/>
+    <p:sldId id="551" r:id="rId24"/>
+    <p:sldId id="552" r:id="rId25"/>
+    <p:sldId id="465" r:id="rId26"/>
+    <p:sldId id="464" r:id="rId27"/>
   </p:sldIdLst>
   <p:sldSz cx="12192000" cy="6858000"/>
   <p:notesSz cx="6858000" cy="9144000"/>
@@ -6891,7 +6900,7 @@
           <a:p>
             <a:r>
               <a:rPr lang="es-ES" altLang="en-US"/>
-              <a:t>Operators</a:t>
+              <a:t>Multicasted Observables</a:t>
             </a:r>
             <a:endParaRPr lang="es-ES" altLang="en-US"/>
           </a:p>
@@ -6899,14 +6908,14 @@
       </p:sp>
       <p:sp>
         <p:nvSpPr>
-          <p:cNvPr id="5" name="Cuadro de texto 4"/>
+          <p:cNvPr id="4" name="Cuadro de texto 3"/>
           <p:cNvSpPr txBox="1"/>
           <p:nvPr/>
         </p:nvSpPr>
         <p:spPr>
           <a:xfrm>
-            <a:off x="299085" y="1892300"/>
-            <a:ext cx="5539105" cy="1198880"/>
+            <a:off x="1376045" y="1796415"/>
+            <a:ext cx="8399145" cy="829945"/>
           </a:xfrm>
           <a:prstGeom prst="rect">
             <a:avLst/>
@@ -6920,7 +6929,7 @@
           <a:p>
             <a:r>
               <a:rPr lang="es-ES" altLang="en-US"/>
-              <a:t>An Operator is essentially a pure function which takes one Observable as input and generates another Observable as output.</a:t>
+              <a:t>A multicasted Observable uses a Subject under the hood to make multiple Observers see the same Observable execution.</a:t>
             </a:r>
             <a:endParaRPr lang="es-ES" altLang="en-US"/>
           </a:p>
@@ -6928,7 +6937,7 @@
       </p:sp>
       <p:pic>
         <p:nvPicPr>
-          <p:cNvPr id="6" name="Imagen 5" descr="operators"/>
+          <p:cNvPr id="5" name="Imagen 4" descr="multi-cast"/>
           <p:cNvPicPr>
             <a:picLocks noChangeAspect="1"/>
           </p:cNvPicPr>
@@ -6942,8 +6951,8 @@
         </p:blipFill>
         <p:spPr>
           <a:xfrm>
-            <a:off x="6884670" y="1892300"/>
-            <a:ext cx="4404995" cy="2956560"/>
+            <a:off x="1066800" y="3093720"/>
+            <a:ext cx="10058400" cy="3016885"/>
           </a:xfrm>
           <a:prstGeom prst="rect">
             <a:avLst/>
@@ -6982,6 +6991,12 @@
         <p:txBody>
           <a:bodyPr/>
           <a:p>
+            <a:r>
+              <a:rPr lang="es-ES" altLang="en-US">
+                <a:sym typeface="+mn-ea"/>
+              </a:rPr>
+              <a:t>RxJS</a:t>
+            </a:r>
             <a:endParaRPr lang="es-ES" altLang="en-US"/>
           </a:p>
         </p:txBody>
@@ -7000,6 +7015,10 @@
         <p:txBody>
           <a:bodyPr/>
           <a:p>
+            <a:r>
+              <a:rPr lang="es-ES" altLang="en-US"/>
+              <a:t>BehaviorSubject</a:t>
+            </a:r>
             <a:endParaRPr lang="es-ES" altLang="en-US"/>
           </a:p>
         </p:txBody>
@@ -7012,8 +7031,8 @@
         </p:nvSpPr>
         <p:spPr>
           <a:xfrm>
-            <a:off x="2633980" y="2004695"/>
-            <a:ext cx="7205980" cy="460375"/>
+            <a:off x="299085" y="2075815"/>
+            <a:ext cx="5159375" cy="2306955"/>
           </a:xfrm>
           <a:prstGeom prst="rect">
             <a:avLst/>
@@ -7021,18 +7040,42 @@
           <a:noFill/>
         </p:spPr>
         <p:txBody>
-          <a:bodyPr wrap="square" rtlCol="0">
+          <a:bodyPr wrap="square" rtlCol="0" anchor="t">
             <a:spAutoFit/>
           </a:bodyPr>
           <a:p>
             <a:r>
               <a:rPr lang="es-ES" altLang="en-US"/>
-              <a:t>Ejercicios Observables</a:t>
+              <a:t>BehaviorSubjects are useful for representing "values over time". For instance, an event stream of birthdays is a Subject, but the stream of a person's age would be a BehaviorSubject.</a:t>
             </a:r>
             <a:endParaRPr lang="es-ES" altLang="en-US"/>
           </a:p>
         </p:txBody>
       </p:sp>
+      <p:pic>
+        <p:nvPicPr>
+          <p:cNvPr id="5" name="Imagen 4" descr="S.BehaviorSubject"/>
+          <p:cNvPicPr>
+            <a:picLocks noChangeAspect="1"/>
+          </p:cNvPicPr>
+          <p:nvPr/>
+        </p:nvPicPr>
+        <p:blipFill>
+          <a:blip r:embed="rId1"/>
+          <a:stretch>
+            <a:fillRect/>
+          </a:stretch>
+        </p:blipFill>
+        <p:spPr>
+          <a:xfrm>
+            <a:off x="5751195" y="1380490"/>
+            <a:ext cx="5703570" cy="3698240"/>
+          </a:xfrm>
+          <a:prstGeom prst="rect">
+            <a:avLst/>
+          </a:prstGeom>
+        </p:spPr>
+      </p:pic>
     </p:spTree>
   </p:cSld>
   <p:clrMapOvr>
@@ -7065,6 +7108,12 @@
         <p:txBody>
           <a:bodyPr/>
           <a:p>
+            <a:r>
+              <a:rPr lang="es-ES" altLang="en-US">
+                <a:sym typeface="+mn-ea"/>
+              </a:rPr>
+              <a:t>RxJS</a:t>
+            </a:r>
             <a:endParaRPr lang="es-ES" altLang="en-US"/>
           </a:p>
         </p:txBody>
@@ -7083,6 +7132,10 @@
         <p:txBody>
           <a:bodyPr/>
           <a:p>
+            <a:r>
+              <a:rPr lang="es-ES" altLang="en-US"/>
+              <a:t>ReplaySubject</a:t>
+            </a:r>
             <a:endParaRPr lang="es-ES" altLang="en-US"/>
           </a:p>
         </p:txBody>
@@ -7095,8 +7148,8 @@
         </p:nvSpPr>
         <p:spPr>
           <a:xfrm>
-            <a:off x="1203960" y="2256790"/>
-            <a:ext cx="9140190" cy="460375"/>
+            <a:off x="299085" y="1732280"/>
+            <a:ext cx="4450715" cy="1568450"/>
           </a:xfrm>
           <a:prstGeom prst="rect">
             <a:avLst/>
@@ -7104,69 +7157,66 @@
           <a:noFill/>
         </p:spPr>
         <p:txBody>
-          <a:bodyPr wrap="square" rtlCol="0">
+          <a:bodyPr wrap="square" rtlCol="0" anchor="t">
             <a:spAutoFit/>
           </a:bodyPr>
           <a:p>
-            <a:pPr lvl="1"/>
             <a:r>
               <a:rPr lang="es-ES" altLang="en-US"/>
-              <a:t>Communication</a:t>
+              <a:t>A ReplaySubject records multiple values from the Observable execution and replays them to new subscribers.</a:t>
             </a:r>
             <a:endParaRPr lang="es-ES" altLang="en-US"/>
           </a:p>
         </p:txBody>
       </p:sp>
-      <p:sp>
-        <p:nvSpPr>
-          <p:cNvPr id="5" name="Cuadro de texto 4"/>
-          <p:cNvSpPr txBox="1"/>
+      <p:pic>
+        <p:nvPicPr>
+          <p:cNvPr id="5" name="Imagen 4"/>
+          <p:cNvPicPr>
+            <a:picLocks noChangeAspect="1"/>
+          </p:cNvPicPr>
           <p:nvPr/>
-        </p:nvSpPr>
-        <p:spPr>
-          <a:xfrm>
-            <a:off x="2252980" y="2717165"/>
-            <a:ext cx="7366000" cy="1568450"/>
-          </a:xfrm>
-          <a:prstGeom prst="rect">
-            <a:avLst/>
-          </a:prstGeom>
-          <a:noFill/>
-        </p:spPr>
-        <p:txBody>
-          <a:bodyPr wrap="square" rtlCol="0">
-            <a:spAutoFit/>
-          </a:bodyPr>
-          <a:p>
-            <a:r>
-              <a:rPr lang="es-ES" altLang="en-US"/>
-              <a:t>Subscribe</a:t>
-            </a:r>
-            <a:endParaRPr lang="es-ES" altLang="en-US"/>
-          </a:p>
-          <a:p>
-            <a:r>
-              <a:rPr lang="es-ES" altLang="en-US"/>
-              <a:t>HttpRequest</a:t>
-            </a:r>
-            <a:endParaRPr lang="es-ES" altLang="en-US"/>
-          </a:p>
-          <a:p>
-            <a:r>
-              <a:rPr lang="es-ES" altLang="en-US"/>
-              <a:t>EventEmmiter</a:t>
-            </a:r>
-            <a:endParaRPr lang="es-ES" altLang="en-US"/>
-          </a:p>
-          <a:p>
-            <a:r>
-              <a:rPr lang="es-ES" altLang="en-US"/>
-              <a:t>AsyncPipe</a:t>
-            </a:r>
-            <a:endParaRPr lang="es-ES" altLang="en-US"/>
-          </a:p>
-        </p:txBody>
-      </p:sp>
+        </p:nvPicPr>
+        <p:blipFill>
+          <a:blip r:embed="rId1"/>
+          <a:stretch>
+            <a:fillRect/>
+          </a:stretch>
+        </p:blipFill>
+        <p:spPr>
+          <a:xfrm>
+            <a:off x="407670" y="5329555"/>
+            <a:ext cx="6851015" cy="845820"/>
+          </a:xfrm>
+          <a:prstGeom prst="rect">
+            <a:avLst/>
+          </a:prstGeom>
+        </p:spPr>
+      </p:pic>
+      <p:pic>
+        <p:nvPicPr>
+          <p:cNvPr id="6" name="Imagen 5" descr="S.ReplaySubject"/>
+          <p:cNvPicPr>
+            <a:picLocks noChangeAspect="1"/>
+          </p:cNvPicPr>
+          <p:nvPr/>
+        </p:nvPicPr>
+        <p:blipFill>
+          <a:blip r:embed="rId2"/>
+          <a:stretch>
+            <a:fillRect/>
+          </a:stretch>
+        </p:blipFill>
+        <p:spPr>
+          <a:xfrm>
+            <a:off x="5391785" y="1038860"/>
+            <a:ext cx="6259195" cy="3960495"/>
+          </a:xfrm>
+          <a:prstGeom prst="rect">
+            <a:avLst/>
+          </a:prstGeom>
+        </p:spPr>
+      </p:pic>
     </p:spTree>
   </p:cSld>
   <p:clrMapOvr>
@@ -7176,6 +7226,1206 @@
 </file>
 
 <file path=ppt/slides/slide13.xml><?xml version="1.0" encoding="utf-8"?>
+<p:sld xmlns:a="http://schemas.openxmlformats.org/drawingml/2006/main" xmlns:r="http://schemas.openxmlformats.org/officeDocument/2006/relationships" xmlns:p="http://schemas.openxmlformats.org/presentationml/2006/main">
+  <p:cSld>
+    <p:spTree>
+      <p:nvGrpSpPr>
+        <p:cNvPr id="1" name=""/>
+        <p:cNvGrpSpPr/>
+        <p:nvPr/>
+      </p:nvGrpSpPr>
+      <p:grpSpPr/>
+      <p:sp>
+        <p:nvSpPr>
+          <p:cNvPr id="2" name="Título 1"/>
+          <p:cNvSpPr>
+            <a:spLocks noGrp="1"/>
+          </p:cNvSpPr>
+          <p:nvPr>
+            <p:ph type="title"/>
+          </p:nvPr>
+        </p:nvSpPr>
+        <p:spPr/>
+        <p:txBody>
+          <a:bodyPr/>
+          <a:p>
+            <a:r>
+              <a:rPr lang="es-ES" altLang="en-US">
+                <a:sym typeface="+mn-ea"/>
+              </a:rPr>
+              <a:t>RxJS</a:t>
+            </a:r>
+            <a:endParaRPr lang="es-ES" altLang="en-US"/>
+          </a:p>
+        </p:txBody>
+      </p:sp>
+      <p:sp>
+        <p:nvSpPr>
+          <p:cNvPr id="3" name="Marcador de posición de texto 2"/>
+          <p:cNvSpPr>
+            <a:spLocks noGrp="1"/>
+          </p:cNvSpPr>
+          <p:nvPr>
+            <p:ph type="body" sz="quarter" idx="13"/>
+          </p:nvPr>
+        </p:nvSpPr>
+        <p:spPr/>
+        <p:txBody>
+          <a:bodyPr/>
+          <a:p>
+            <a:r>
+              <a:rPr lang="es-ES" altLang="en-US"/>
+              <a:t>AsyncSubject</a:t>
+            </a:r>
+            <a:endParaRPr lang="es-ES" altLang="en-US"/>
+          </a:p>
+        </p:txBody>
+      </p:sp>
+      <p:sp>
+        <p:nvSpPr>
+          <p:cNvPr id="7" name="Cuadro de texto 6"/>
+          <p:cNvSpPr txBox="1"/>
+          <p:nvPr/>
+        </p:nvSpPr>
+        <p:spPr>
+          <a:xfrm>
+            <a:off x="407670" y="1402715"/>
+            <a:ext cx="4699635" cy="1938020"/>
+          </a:xfrm>
+          <a:prstGeom prst="rect">
+            <a:avLst/>
+          </a:prstGeom>
+          <a:noFill/>
+        </p:spPr>
+        <p:txBody>
+          <a:bodyPr wrap="square" rtlCol="0" anchor="t">
+            <a:spAutoFit/>
+          </a:bodyPr>
+          <a:p>
+            <a:r>
+              <a:rPr lang="es-ES" altLang="en-US"/>
+              <a:t>The AsyncSubject is a variant where only the last value of the Observable execution is sent to its observers, and only when the execution completes.</a:t>
+            </a:r>
+            <a:endParaRPr lang="es-ES" altLang="en-US"/>
+          </a:p>
+        </p:txBody>
+      </p:sp>
+      <p:pic>
+        <p:nvPicPr>
+          <p:cNvPr id="8" name="Imagen 7" descr="S.AsyncSubject"/>
+          <p:cNvPicPr>
+            <a:picLocks noChangeAspect="1"/>
+          </p:cNvPicPr>
+          <p:nvPr/>
+        </p:nvPicPr>
+        <p:blipFill>
+          <a:blip r:embed="rId1"/>
+          <a:stretch>
+            <a:fillRect/>
+          </a:stretch>
+        </p:blipFill>
+        <p:spPr>
+          <a:xfrm>
+            <a:off x="5598795" y="1005205"/>
+            <a:ext cx="5811520" cy="4483100"/>
+          </a:xfrm>
+          <a:prstGeom prst="rect">
+            <a:avLst/>
+          </a:prstGeom>
+        </p:spPr>
+      </p:pic>
+    </p:spTree>
+  </p:cSld>
+  <p:clrMapOvr>
+    <a:masterClrMapping/>
+  </p:clrMapOvr>
+</p:sld>
+</file>
+
+<file path=ppt/slides/slide14.xml><?xml version="1.0" encoding="utf-8"?>
+<p:sld xmlns:a="http://schemas.openxmlformats.org/drawingml/2006/main" xmlns:r="http://schemas.openxmlformats.org/officeDocument/2006/relationships" xmlns:p="http://schemas.openxmlformats.org/presentationml/2006/main">
+  <p:cSld>
+    <p:spTree>
+      <p:nvGrpSpPr>
+        <p:cNvPr id="1" name=""/>
+        <p:cNvGrpSpPr/>
+        <p:nvPr/>
+      </p:nvGrpSpPr>
+      <p:grpSpPr/>
+      <p:sp>
+        <p:nvSpPr>
+          <p:cNvPr id="2" name="Título 1"/>
+          <p:cNvSpPr>
+            <a:spLocks noGrp="1"/>
+          </p:cNvSpPr>
+          <p:nvPr>
+            <p:ph type="title"/>
+          </p:nvPr>
+        </p:nvSpPr>
+        <p:spPr/>
+        <p:txBody>
+          <a:bodyPr/>
+          <a:p>
+            <a:r>
+              <a:rPr lang="es-ES" altLang="en-US">
+                <a:sym typeface="+mn-ea"/>
+              </a:rPr>
+              <a:t>Rxjs</a:t>
+            </a:r>
+            <a:endParaRPr lang="es-ES" altLang="en-US"/>
+          </a:p>
+        </p:txBody>
+      </p:sp>
+      <p:sp>
+        <p:nvSpPr>
+          <p:cNvPr id="3" name="Marcador de posición de texto 2"/>
+          <p:cNvSpPr>
+            <a:spLocks noGrp="1"/>
+          </p:cNvSpPr>
+          <p:nvPr>
+            <p:ph type="body" sz="quarter" idx="13"/>
+          </p:nvPr>
+        </p:nvSpPr>
+        <p:spPr/>
+        <p:txBody>
+          <a:bodyPr/>
+          <a:p>
+            <a:r>
+              <a:rPr lang="es-ES" altLang="en-US"/>
+              <a:t>Exercise</a:t>
+            </a:r>
+            <a:endParaRPr lang="es-ES" altLang="en-US"/>
+          </a:p>
+        </p:txBody>
+      </p:sp>
+      <p:sp>
+        <p:nvSpPr>
+          <p:cNvPr id="4" name="Cuadro de texto 3"/>
+          <p:cNvSpPr txBox="1"/>
+          <p:nvPr/>
+        </p:nvSpPr>
+        <p:spPr>
+          <a:xfrm>
+            <a:off x="1872615" y="3014345"/>
+            <a:ext cx="8446135" cy="829945"/>
+          </a:xfrm>
+          <a:prstGeom prst="rect">
+            <a:avLst/>
+          </a:prstGeom>
+          <a:noFill/>
+        </p:spPr>
+        <p:txBody>
+          <a:bodyPr wrap="square" rtlCol="0" anchor="t">
+            <a:spAutoFit/>
+          </a:bodyPr>
+          <a:p>
+            <a:r>
+              <a:rPr lang="es-ES" altLang="en-US"/>
+              <a:t>git clone https://github.com/rached193/AngularWorkshop-20181116/tree/master/01_best_practices/tslint</a:t>
+            </a:r>
+            <a:endParaRPr lang="es-ES" altLang="en-US"/>
+          </a:p>
+        </p:txBody>
+      </p:sp>
+      <p:sp>
+        <p:nvSpPr>
+          <p:cNvPr id="6" name="Cuadro de texto 5"/>
+          <p:cNvSpPr txBox="1"/>
+          <p:nvPr/>
+        </p:nvSpPr>
+        <p:spPr>
+          <a:xfrm>
+            <a:off x="1872615" y="4801235"/>
+            <a:ext cx="5607685" cy="829945"/>
+          </a:xfrm>
+          <a:prstGeom prst="rect">
+            <a:avLst/>
+          </a:prstGeom>
+          <a:noFill/>
+        </p:spPr>
+        <p:txBody>
+          <a:bodyPr wrap="square" rtlCol="0">
+            <a:spAutoFit/>
+          </a:bodyPr>
+          <a:p>
+            <a:r>
+              <a:rPr lang="es-ES" altLang="en-US"/>
+              <a:t>tsc [name] -&gt; compile the file</a:t>
+            </a:r>
+            <a:endParaRPr lang="es-ES" altLang="en-US"/>
+          </a:p>
+          <a:p>
+            <a:r>
+              <a:rPr lang="es-ES" altLang="en-US"/>
+              <a:t>node [name] -&gt; execute file</a:t>
+            </a:r>
+            <a:endParaRPr lang="es-ES" altLang="en-US"/>
+          </a:p>
+        </p:txBody>
+      </p:sp>
+    </p:spTree>
+  </p:cSld>
+  <p:clrMapOvr>
+    <a:masterClrMapping/>
+  </p:clrMapOvr>
+</p:sld>
+</file>
+
+<file path=ppt/slides/slide15.xml><?xml version="1.0" encoding="utf-8"?>
+<p:sld xmlns:a="http://schemas.openxmlformats.org/drawingml/2006/main" xmlns:r="http://schemas.openxmlformats.org/officeDocument/2006/relationships" xmlns:p="http://schemas.openxmlformats.org/presentationml/2006/main">
+  <p:cSld>
+    <p:spTree>
+      <p:nvGrpSpPr>
+        <p:cNvPr id="1" name=""/>
+        <p:cNvGrpSpPr/>
+        <p:nvPr/>
+      </p:nvGrpSpPr>
+      <p:grpSpPr/>
+      <p:sp>
+        <p:nvSpPr>
+          <p:cNvPr id="2" name="Título 1"/>
+          <p:cNvSpPr>
+            <a:spLocks noGrp="1"/>
+          </p:cNvSpPr>
+          <p:nvPr>
+            <p:ph type="title"/>
+          </p:nvPr>
+        </p:nvSpPr>
+        <p:spPr/>
+        <p:txBody>
+          <a:bodyPr/>
+          <a:p>
+            <a:r>
+              <a:rPr lang="es-ES" altLang="en-US">
+                <a:sym typeface="+mn-ea"/>
+              </a:rPr>
+              <a:t>RxJS</a:t>
+            </a:r>
+            <a:br>
+              <a:rPr lang="es-ES" altLang="en-US"/>
+            </a:br>
+            <a:endParaRPr lang="es-ES" altLang="en-US"/>
+          </a:p>
+        </p:txBody>
+      </p:sp>
+      <p:sp>
+        <p:nvSpPr>
+          <p:cNvPr id="3" name="Marcador de posición de texto 2"/>
+          <p:cNvSpPr>
+            <a:spLocks noGrp="1"/>
+          </p:cNvSpPr>
+          <p:nvPr>
+            <p:ph type="body" sz="quarter" idx="13"/>
+          </p:nvPr>
+        </p:nvSpPr>
+        <p:spPr/>
+        <p:txBody>
+          <a:bodyPr/>
+          <a:p>
+            <a:r>
+              <a:rPr lang="es-ES" altLang="en-US"/>
+              <a:t>Operators</a:t>
+            </a:r>
+            <a:endParaRPr lang="es-ES" altLang="en-US"/>
+          </a:p>
+        </p:txBody>
+      </p:sp>
+      <p:sp>
+        <p:nvSpPr>
+          <p:cNvPr id="5" name="Cuadro de texto 4"/>
+          <p:cNvSpPr txBox="1"/>
+          <p:nvPr/>
+        </p:nvSpPr>
+        <p:spPr>
+          <a:xfrm>
+            <a:off x="299085" y="1892300"/>
+            <a:ext cx="5539105" cy="1198880"/>
+          </a:xfrm>
+          <a:prstGeom prst="rect">
+            <a:avLst/>
+          </a:prstGeom>
+          <a:noFill/>
+        </p:spPr>
+        <p:txBody>
+          <a:bodyPr wrap="square" rtlCol="0" anchor="t">
+            <a:spAutoFit/>
+          </a:bodyPr>
+          <a:p>
+            <a:r>
+              <a:rPr lang="es-ES" altLang="en-US"/>
+              <a:t>An Operator is essentially a pure function which takes one Observable as input and generates another Observable as output.</a:t>
+            </a:r>
+            <a:endParaRPr lang="es-ES" altLang="en-US"/>
+          </a:p>
+        </p:txBody>
+      </p:sp>
+      <p:pic>
+        <p:nvPicPr>
+          <p:cNvPr id="6" name="Imagen 5" descr="operators"/>
+          <p:cNvPicPr>
+            <a:picLocks noChangeAspect="1"/>
+          </p:cNvPicPr>
+          <p:nvPr/>
+        </p:nvPicPr>
+        <p:blipFill>
+          <a:blip r:embed="rId1"/>
+          <a:stretch>
+            <a:fillRect/>
+          </a:stretch>
+        </p:blipFill>
+        <p:spPr>
+          <a:xfrm>
+            <a:off x="6884670" y="1892300"/>
+            <a:ext cx="4404995" cy="2956560"/>
+          </a:xfrm>
+          <a:prstGeom prst="rect">
+            <a:avLst/>
+          </a:prstGeom>
+        </p:spPr>
+      </p:pic>
+    </p:spTree>
+  </p:cSld>
+  <p:clrMapOvr>
+    <a:masterClrMapping/>
+  </p:clrMapOvr>
+</p:sld>
+</file>
+
+<file path=ppt/slides/slide16.xml><?xml version="1.0" encoding="utf-8"?>
+<p:sld xmlns:a="http://schemas.openxmlformats.org/drawingml/2006/main" xmlns:r="http://schemas.openxmlformats.org/officeDocument/2006/relationships" xmlns:p="http://schemas.openxmlformats.org/presentationml/2006/main">
+  <p:cSld>
+    <p:spTree>
+      <p:nvGrpSpPr>
+        <p:cNvPr id="1" name=""/>
+        <p:cNvGrpSpPr/>
+        <p:nvPr/>
+      </p:nvGrpSpPr>
+      <p:grpSpPr/>
+      <p:sp>
+        <p:nvSpPr>
+          <p:cNvPr id="2" name="Título 1"/>
+          <p:cNvSpPr>
+            <a:spLocks noGrp="1"/>
+          </p:cNvSpPr>
+          <p:nvPr>
+            <p:ph type="title"/>
+          </p:nvPr>
+        </p:nvSpPr>
+        <p:spPr/>
+        <p:txBody>
+          <a:bodyPr/>
+          <a:p>
+            <a:r>
+              <a:rPr lang="es-ES" altLang="en-US"/>
+              <a:t>RxJS</a:t>
+            </a:r>
+            <a:endParaRPr lang="es-ES" altLang="en-US"/>
+          </a:p>
+        </p:txBody>
+      </p:sp>
+      <p:sp>
+        <p:nvSpPr>
+          <p:cNvPr id="3" name="Marcador de posición de texto 2"/>
+          <p:cNvSpPr>
+            <a:spLocks noGrp="1"/>
+          </p:cNvSpPr>
+          <p:nvPr>
+            <p:ph type="body" sz="quarter" idx="13"/>
+          </p:nvPr>
+        </p:nvSpPr>
+        <p:spPr/>
+        <p:txBody>
+          <a:bodyPr/>
+          <a:p>
+            <a:r>
+              <a:rPr lang="es-ES" altLang="en-US"/>
+              <a:t>Angular</a:t>
+            </a:r>
+            <a:endParaRPr lang="es-ES" altLang="en-US"/>
+          </a:p>
+        </p:txBody>
+      </p:sp>
+      <p:sp>
+        <p:nvSpPr>
+          <p:cNvPr id="5" name="Cuadro de texto 4"/>
+          <p:cNvSpPr txBox="1"/>
+          <p:nvPr/>
+        </p:nvSpPr>
+        <p:spPr>
+          <a:xfrm>
+            <a:off x="1686560" y="1699895"/>
+            <a:ext cx="8818245" cy="1568450"/>
+          </a:xfrm>
+          <a:prstGeom prst="rect">
+            <a:avLst/>
+          </a:prstGeom>
+          <a:noFill/>
+        </p:spPr>
+        <p:txBody>
+          <a:bodyPr wrap="square" rtlCol="0" anchor="t">
+            <a:spAutoFit/>
+          </a:bodyPr>
+          <a:p>
+            <a:r>
+              <a:rPr lang="es-ES" altLang="en-US"/>
+              <a:t>Angular makes use of observables as an interface to handle a variety of common asynchronous operations. </a:t>
+            </a:r>
+            <a:endParaRPr lang="es-ES" altLang="en-US"/>
+          </a:p>
+          <a:p>
+            <a:endParaRPr lang="es-ES" altLang="en-US"/>
+          </a:p>
+          <a:p>
+            <a:endParaRPr lang="es-ES" altLang="en-US"/>
+          </a:p>
+        </p:txBody>
+      </p:sp>
+      <p:pic>
+        <p:nvPicPr>
+          <p:cNvPr id="6" name="Imagen 5" descr="angular"/>
+          <p:cNvPicPr>
+            <a:picLocks noChangeAspect="1"/>
+          </p:cNvPicPr>
+          <p:nvPr/>
+        </p:nvPicPr>
+        <p:blipFill>
+          <a:blip r:embed="rId1"/>
+          <a:stretch>
+            <a:fillRect/>
+          </a:stretch>
+        </p:blipFill>
+        <p:spPr>
+          <a:xfrm>
+            <a:off x="3041015" y="3602355"/>
+            <a:ext cx="6109970" cy="2601595"/>
+          </a:xfrm>
+          <a:prstGeom prst="rect">
+            <a:avLst/>
+          </a:prstGeom>
+        </p:spPr>
+      </p:pic>
+    </p:spTree>
+  </p:cSld>
+  <p:clrMapOvr>
+    <a:masterClrMapping/>
+  </p:clrMapOvr>
+</p:sld>
+</file>
+
+<file path=ppt/slides/slide17.xml><?xml version="1.0" encoding="utf-8"?>
+<p:sld xmlns:a="http://schemas.openxmlformats.org/drawingml/2006/main" xmlns:r="http://schemas.openxmlformats.org/officeDocument/2006/relationships" xmlns:p="http://schemas.openxmlformats.org/presentationml/2006/main">
+  <p:cSld>
+    <p:spTree>
+      <p:nvGrpSpPr>
+        <p:cNvPr id="1" name=""/>
+        <p:cNvGrpSpPr/>
+        <p:nvPr/>
+      </p:nvGrpSpPr>
+      <p:grpSpPr/>
+      <p:sp>
+        <p:nvSpPr>
+          <p:cNvPr id="2" name="Título 1"/>
+          <p:cNvSpPr>
+            <a:spLocks noGrp="1"/>
+          </p:cNvSpPr>
+          <p:nvPr>
+            <p:ph type="title"/>
+          </p:nvPr>
+        </p:nvSpPr>
+        <p:spPr/>
+        <p:txBody>
+          <a:bodyPr/>
+          <a:p>
+            <a:r>
+              <a:rPr lang="es-ES" altLang="en-US">
+                <a:sym typeface="+mn-ea"/>
+              </a:rPr>
+              <a:t>Angular</a:t>
+            </a:r>
+            <a:endParaRPr lang="es-ES" altLang="en-US"/>
+          </a:p>
+        </p:txBody>
+      </p:sp>
+      <p:sp>
+        <p:nvSpPr>
+          <p:cNvPr id="3" name="Marcador de posición de texto 2"/>
+          <p:cNvSpPr>
+            <a:spLocks noGrp="1"/>
+          </p:cNvSpPr>
+          <p:nvPr>
+            <p:ph type="body" sz="quarter" idx="13"/>
+          </p:nvPr>
+        </p:nvSpPr>
+        <p:spPr/>
+        <p:txBody>
+          <a:bodyPr/>
+          <a:p>
+            <a:r>
+              <a:rPr lang="es-ES" altLang="en-US"/>
+              <a:t>EventEmitter</a:t>
+            </a:r>
+            <a:endParaRPr lang="es-ES" altLang="en-US"/>
+          </a:p>
+        </p:txBody>
+      </p:sp>
+      <p:sp>
+        <p:nvSpPr>
+          <p:cNvPr id="6" name="Cuadro de texto 5"/>
+          <p:cNvSpPr txBox="1"/>
+          <p:nvPr/>
+        </p:nvSpPr>
+        <p:spPr>
+          <a:xfrm>
+            <a:off x="249555" y="2275840"/>
+            <a:ext cx="7729855" cy="1568450"/>
+          </a:xfrm>
+          <a:prstGeom prst="rect">
+            <a:avLst/>
+          </a:prstGeom>
+          <a:noFill/>
+        </p:spPr>
+        <p:txBody>
+          <a:bodyPr wrap="square" rtlCol="0" anchor="t">
+            <a:spAutoFit/>
+          </a:bodyPr>
+          <a:p>
+            <a:r>
+              <a:rPr lang="es-ES" altLang="en-US"/>
+              <a:t>Angular provides an EventEmitter class that is used when publishing values from a component through the @Output() decorator. EventEmitter extends Observable, adding an emit() method so it can send arbitrary values. </a:t>
+            </a:r>
+            <a:endParaRPr lang="es-ES" altLang="en-US"/>
+          </a:p>
+        </p:txBody>
+      </p:sp>
+    </p:spTree>
+  </p:cSld>
+  <p:clrMapOvr>
+    <a:masterClrMapping/>
+  </p:clrMapOvr>
+</p:sld>
+</file>
+
+<file path=ppt/slides/slide18.xml><?xml version="1.0" encoding="utf-8"?>
+<p:sld xmlns:a="http://schemas.openxmlformats.org/drawingml/2006/main" xmlns:r="http://schemas.openxmlformats.org/officeDocument/2006/relationships" xmlns:p="http://schemas.openxmlformats.org/presentationml/2006/main">
+  <p:cSld>
+    <p:spTree>
+      <p:nvGrpSpPr>
+        <p:cNvPr id="1" name=""/>
+        <p:cNvGrpSpPr/>
+        <p:nvPr/>
+      </p:nvGrpSpPr>
+      <p:grpSpPr/>
+      <p:sp>
+        <p:nvSpPr>
+          <p:cNvPr id="2" name="Título 1"/>
+          <p:cNvSpPr>
+            <a:spLocks noGrp="1"/>
+          </p:cNvSpPr>
+          <p:nvPr>
+            <p:ph type="title"/>
+          </p:nvPr>
+        </p:nvSpPr>
+        <p:spPr/>
+        <p:txBody>
+          <a:bodyPr/>
+          <a:p>
+            <a:r>
+              <a:rPr lang="es-ES" altLang="en-US">
+                <a:sym typeface="+mn-ea"/>
+              </a:rPr>
+              <a:t>Angular</a:t>
+            </a:r>
+            <a:endParaRPr lang="es-ES" altLang="en-US"/>
+          </a:p>
+        </p:txBody>
+      </p:sp>
+      <p:sp>
+        <p:nvSpPr>
+          <p:cNvPr id="3" name="Marcador de posición de texto 2"/>
+          <p:cNvSpPr>
+            <a:spLocks noGrp="1"/>
+          </p:cNvSpPr>
+          <p:nvPr>
+            <p:ph type="body" sz="quarter" idx="13"/>
+          </p:nvPr>
+        </p:nvSpPr>
+        <p:spPr/>
+        <p:txBody>
+          <a:bodyPr/>
+          <a:p>
+            <a:r>
+              <a:rPr lang="es-ES" altLang="en-US"/>
+              <a:t>HTTP</a:t>
+            </a:r>
+            <a:endParaRPr lang="es-ES" altLang="en-US"/>
+          </a:p>
+        </p:txBody>
+      </p:sp>
+      <p:sp>
+        <p:nvSpPr>
+          <p:cNvPr id="7" name="Cuadro de texto 6"/>
+          <p:cNvSpPr txBox="1"/>
+          <p:nvPr/>
+        </p:nvSpPr>
+        <p:spPr>
+          <a:xfrm>
+            <a:off x="351155" y="1758315"/>
+            <a:ext cx="5344160" cy="1198880"/>
+          </a:xfrm>
+          <a:prstGeom prst="rect">
+            <a:avLst/>
+          </a:prstGeom>
+          <a:noFill/>
+        </p:spPr>
+        <p:txBody>
+          <a:bodyPr wrap="square" rtlCol="0" anchor="t">
+            <a:spAutoFit/>
+          </a:bodyPr>
+          <a:p>
+            <a:r>
+              <a:rPr lang="es-ES" altLang="en-US"/>
+              <a:t>Angular’s HttpClient returns observables from HTTP method calls. For instance, http.get(‘/api’) returns an observable. </a:t>
+            </a:r>
+            <a:endParaRPr lang="es-ES" altLang="en-US"/>
+          </a:p>
+        </p:txBody>
+      </p:sp>
+    </p:spTree>
+  </p:cSld>
+  <p:clrMapOvr>
+    <a:masterClrMapping/>
+  </p:clrMapOvr>
+</p:sld>
+</file>
+
+<file path=ppt/slides/slide19.xml><?xml version="1.0" encoding="utf-8"?>
+<p:sld xmlns:a="http://schemas.openxmlformats.org/drawingml/2006/main" xmlns:r="http://schemas.openxmlformats.org/officeDocument/2006/relationships" xmlns:p="http://schemas.openxmlformats.org/presentationml/2006/main">
+  <p:cSld>
+    <p:spTree>
+      <p:nvGrpSpPr>
+        <p:cNvPr id="1" name=""/>
+        <p:cNvGrpSpPr/>
+        <p:nvPr/>
+      </p:nvGrpSpPr>
+      <p:grpSpPr/>
+      <p:sp>
+        <p:nvSpPr>
+          <p:cNvPr id="2" name="Título 1"/>
+          <p:cNvSpPr>
+            <a:spLocks noGrp="1"/>
+          </p:cNvSpPr>
+          <p:nvPr>
+            <p:ph type="title"/>
+          </p:nvPr>
+        </p:nvSpPr>
+        <p:spPr/>
+        <p:txBody>
+          <a:bodyPr/>
+          <a:p>
+            <a:r>
+              <a:rPr lang="es-ES" altLang="en-US">
+                <a:sym typeface="+mn-ea"/>
+              </a:rPr>
+              <a:t>Angular</a:t>
+            </a:r>
+            <a:endParaRPr lang="es-ES" altLang="en-US"/>
+          </a:p>
+        </p:txBody>
+      </p:sp>
+      <p:sp>
+        <p:nvSpPr>
+          <p:cNvPr id="3" name="Marcador de posición de texto 2"/>
+          <p:cNvSpPr>
+            <a:spLocks noGrp="1"/>
+          </p:cNvSpPr>
+          <p:nvPr>
+            <p:ph type="body" sz="quarter" idx="13"/>
+          </p:nvPr>
+        </p:nvSpPr>
+        <p:spPr/>
+        <p:txBody>
+          <a:bodyPr/>
+          <a:p>
+            <a:r>
+              <a:rPr lang="es-ES" altLang="en-US"/>
+              <a:t>Async pipe</a:t>
+            </a:r>
+            <a:endParaRPr lang="es-ES" altLang="en-US"/>
+          </a:p>
+        </p:txBody>
+      </p:sp>
+      <p:sp>
+        <p:nvSpPr>
+          <p:cNvPr id="4" name="Cuadro de texto 3"/>
+          <p:cNvSpPr txBox="1"/>
+          <p:nvPr/>
+        </p:nvSpPr>
+        <p:spPr>
+          <a:xfrm>
+            <a:off x="299085" y="1704975"/>
+            <a:ext cx="8570595" cy="1198880"/>
+          </a:xfrm>
+          <a:prstGeom prst="rect">
+            <a:avLst/>
+          </a:prstGeom>
+          <a:noFill/>
+        </p:spPr>
+        <p:txBody>
+          <a:bodyPr wrap="square" rtlCol="0" anchor="t">
+            <a:spAutoFit/>
+          </a:bodyPr>
+          <a:p>
+            <a:r>
+              <a:rPr lang="es-ES" altLang="en-US"/>
+              <a:t>The AsyncPipe subscribes to an observable or promise and returns the latest value it has emitted. When a new value is emitted, the pipe marks the component to be checked for changes.</a:t>
+            </a:r>
+            <a:endParaRPr lang="es-ES" altLang="en-US"/>
+          </a:p>
+        </p:txBody>
+      </p:sp>
+    </p:spTree>
+  </p:cSld>
+  <p:clrMapOvr>
+    <a:masterClrMapping/>
+  </p:clrMapOvr>
+</p:sld>
+</file>
+
+<file path=ppt/slides/slide2.xml><?xml version="1.0" encoding="utf-8"?>
+<p:sld xmlns:a="http://schemas.openxmlformats.org/drawingml/2006/main" xmlns:r="http://schemas.openxmlformats.org/officeDocument/2006/relationships" xmlns:p="http://schemas.openxmlformats.org/presentationml/2006/main" showMasterSp="0">
+  <p:cSld>
+    <p:spTree>
+      <p:nvGrpSpPr>
+        <p:cNvPr id="1" name=""/>
+        <p:cNvGrpSpPr/>
+        <p:nvPr/>
+      </p:nvGrpSpPr>
+      <p:grpSpPr/>
+      <p:sp>
+        <p:nvSpPr>
+          <p:cNvPr id="2" name="Title 1"/>
+          <p:cNvSpPr>
+            <a:spLocks noGrp="1"/>
+          </p:cNvSpPr>
+          <p:nvPr>
+            <p:ph type="title"/>
+          </p:nvPr>
+        </p:nvSpPr>
+        <p:spPr>
+          <a:xfrm>
+            <a:off x="1487488" y="523903"/>
+            <a:ext cx="7584744" cy="859035"/>
+          </a:xfrm>
+        </p:spPr>
+        <p:txBody>
+          <a:bodyPr>
+            <a:normAutofit fontScale="90000"/>
+          </a:bodyPr>
+          <a:p>
+            <a:br>
+              <a:rPr lang="es-ES" altLang="en-US"/>
+            </a:br>
+            <a:endParaRPr lang="es-ES" altLang="en-US"/>
+          </a:p>
+        </p:txBody>
+      </p:sp>
+      <p:sp>
+        <p:nvSpPr>
+          <p:cNvPr id="3" name="Text Box 2"/>
+          <p:cNvSpPr txBox="1"/>
+          <p:nvPr/>
+        </p:nvSpPr>
+        <p:spPr>
+          <a:xfrm>
+            <a:off x="4169410" y="4260850"/>
+            <a:ext cx="4065270" cy="1938020"/>
+          </a:xfrm>
+          <a:prstGeom prst="rect">
+            <a:avLst/>
+          </a:prstGeom>
+          <a:noFill/>
+        </p:spPr>
+        <p:txBody>
+          <a:bodyPr wrap="square" rtlCol="0" anchor="t">
+            <a:spAutoFit/>
+          </a:bodyPr>
+          <a:p>
+            <a:pPr marL="457200" indent="-457200">
+              <a:buAutoNum type="arabicPeriod"/>
+            </a:pPr>
+            <a:r>
+              <a:rPr lang="es-ES" altLang="en-US">
+                <a:solidFill>
+                  <a:schemeClr val="bg1"/>
+                </a:solidFill>
+              </a:rPr>
+              <a:t>Best practices in Angular</a:t>
+            </a:r>
+            <a:endParaRPr lang="en-US">
+              <a:solidFill>
+                <a:schemeClr val="bg1"/>
+              </a:solidFill>
+            </a:endParaRPr>
+          </a:p>
+          <a:p>
+            <a:pPr marL="457200" indent="-457200">
+              <a:buAutoNum type="arabicPeriod"/>
+            </a:pPr>
+            <a:r>
+              <a:rPr lang="en-US">
+                <a:solidFill>
+                  <a:schemeClr val="bg1"/>
+                </a:solidFill>
+              </a:rPr>
+              <a:t>Angular CLI</a:t>
+            </a:r>
+            <a:endParaRPr lang="en-US">
+              <a:solidFill>
+                <a:schemeClr val="bg1"/>
+              </a:solidFill>
+            </a:endParaRPr>
+          </a:p>
+          <a:p>
+            <a:pPr marL="457200" indent="-457200">
+              <a:buAutoNum type="arabicPeriod"/>
+            </a:pPr>
+            <a:r>
+              <a:rPr lang="es-ES" altLang="en-US">
+                <a:solidFill>
+                  <a:schemeClr val="bg1"/>
+                </a:solidFill>
+                <a:sym typeface="+mn-ea"/>
+              </a:rPr>
+              <a:t>Automatic Documentation</a:t>
+            </a:r>
+            <a:endParaRPr lang="es-ES" altLang="en-US">
+              <a:solidFill>
+                <a:schemeClr val="bg1"/>
+              </a:solidFill>
+              <a:sym typeface="+mn-ea"/>
+            </a:endParaRPr>
+          </a:p>
+          <a:p>
+            <a:pPr marL="457200" indent="-457200">
+              <a:buAutoNum type="arabicPeriod"/>
+            </a:pPr>
+            <a:r>
+              <a:rPr lang="es-ES" altLang="en-US">
+                <a:solidFill>
+                  <a:schemeClr val="bg1"/>
+                </a:solidFill>
+              </a:rPr>
+              <a:t>Reactive Programming</a:t>
+            </a:r>
+            <a:endParaRPr lang="es-ES" altLang="en-US">
+              <a:solidFill>
+                <a:schemeClr val="bg1"/>
+              </a:solidFill>
+            </a:endParaRPr>
+          </a:p>
+          <a:p>
+            <a:pPr marL="457200" indent="-457200">
+              <a:buAutoNum type="arabicPeriod"/>
+            </a:pPr>
+            <a:endParaRPr lang="en-US">
+              <a:solidFill>
+                <a:schemeClr val="bg1"/>
+              </a:solidFill>
+            </a:endParaRPr>
+          </a:p>
+        </p:txBody>
+      </p:sp>
+      <p:pic>
+        <p:nvPicPr>
+          <p:cNvPr id="7" name="Picture 6" descr="Angular_full_color_logo.svg"/>
+          <p:cNvPicPr>
+            <a:picLocks noChangeAspect="1"/>
+          </p:cNvPicPr>
+          <p:nvPr/>
+        </p:nvPicPr>
+        <p:blipFill>
+          <a:blip r:embed="rId1"/>
+          <a:stretch>
+            <a:fillRect/>
+          </a:stretch>
+        </p:blipFill>
+        <p:spPr>
+          <a:xfrm>
+            <a:off x="3524885" y="1383030"/>
+            <a:ext cx="2529205" cy="2529205"/>
+          </a:xfrm>
+          <a:prstGeom prst="rect">
+            <a:avLst/>
+          </a:prstGeom>
+        </p:spPr>
+      </p:pic>
+      <p:pic>
+        <p:nvPicPr>
+          <p:cNvPr id="8" name="Picture 7" descr="typescript"/>
+          <p:cNvPicPr>
+            <a:picLocks noChangeAspect="1"/>
+          </p:cNvPicPr>
+          <p:nvPr/>
+        </p:nvPicPr>
+        <p:blipFill>
+          <a:blip r:embed="rId2"/>
+          <a:stretch>
+            <a:fillRect/>
+          </a:stretch>
+        </p:blipFill>
+        <p:spPr>
+          <a:xfrm>
+            <a:off x="6402070" y="1663065"/>
+            <a:ext cx="1980565" cy="1980565"/>
+          </a:xfrm>
+          <a:prstGeom prst="rect">
+            <a:avLst/>
+          </a:prstGeom>
+        </p:spPr>
+      </p:pic>
+    </p:spTree>
+  </p:cSld>
+  <p:clrMapOvr>
+    <a:masterClrMapping/>
+  </p:clrMapOvr>
+</p:sld>
+</file>
+
+<file path=ppt/slides/slide20.xml><?xml version="1.0" encoding="utf-8"?>
+<p:sld xmlns:a="http://schemas.openxmlformats.org/drawingml/2006/main" xmlns:r="http://schemas.openxmlformats.org/officeDocument/2006/relationships" xmlns:p="http://schemas.openxmlformats.org/presentationml/2006/main">
+  <p:cSld>
+    <p:spTree>
+      <p:nvGrpSpPr>
+        <p:cNvPr id="1" name=""/>
+        <p:cNvGrpSpPr/>
+        <p:nvPr/>
+      </p:nvGrpSpPr>
+      <p:grpSpPr/>
+      <p:sp>
+        <p:nvSpPr>
+          <p:cNvPr id="2" name="Título 1"/>
+          <p:cNvSpPr>
+            <a:spLocks noGrp="1"/>
+          </p:cNvSpPr>
+          <p:nvPr>
+            <p:ph type="title"/>
+          </p:nvPr>
+        </p:nvSpPr>
+        <p:spPr/>
+        <p:txBody>
+          <a:bodyPr/>
+          <a:p>
+            <a:r>
+              <a:rPr lang="es-ES" altLang="en-US">
+                <a:sym typeface="+mn-ea"/>
+              </a:rPr>
+              <a:t>Angular</a:t>
+            </a:r>
+            <a:endParaRPr lang="es-ES" altLang="en-US"/>
+          </a:p>
+        </p:txBody>
+      </p:sp>
+      <p:sp>
+        <p:nvSpPr>
+          <p:cNvPr id="3" name="Marcador de posición de texto 2"/>
+          <p:cNvSpPr>
+            <a:spLocks noGrp="1"/>
+          </p:cNvSpPr>
+          <p:nvPr>
+            <p:ph type="body" sz="quarter" idx="13"/>
+          </p:nvPr>
+        </p:nvSpPr>
+        <p:spPr/>
+        <p:txBody>
+          <a:bodyPr/>
+          <a:p>
+            <a:r>
+              <a:rPr lang="es-ES" altLang="en-US"/>
+              <a:t>Router</a:t>
+            </a:r>
+            <a:endParaRPr lang="es-ES" altLang="en-US"/>
+          </a:p>
+        </p:txBody>
+      </p:sp>
+      <p:sp>
+        <p:nvSpPr>
+          <p:cNvPr id="4" name="Cuadro de texto 3"/>
+          <p:cNvSpPr txBox="1"/>
+          <p:nvPr/>
+        </p:nvSpPr>
+        <p:spPr>
+          <a:xfrm>
+            <a:off x="299085" y="2139950"/>
+            <a:ext cx="7117080" cy="1938020"/>
+          </a:xfrm>
+          <a:prstGeom prst="rect">
+            <a:avLst/>
+          </a:prstGeom>
+          <a:noFill/>
+        </p:spPr>
+        <p:txBody>
+          <a:bodyPr wrap="square" rtlCol="0" anchor="t">
+            <a:spAutoFit/>
+          </a:bodyPr>
+          <a:p>
+            <a:r>
+              <a:rPr lang="es-ES" altLang="en-US"/>
+              <a:t>Router.events provides events as observables. You can use the filter() operator from RxJS to look for events of interest, and subscribe to them in order to make decisions based on the sequence of events in the navigation process.</a:t>
+            </a:r>
+            <a:endParaRPr lang="es-ES" altLang="en-US"/>
+          </a:p>
+        </p:txBody>
+      </p:sp>
+    </p:spTree>
+  </p:cSld>
+  <p:clrMapOvr>
+    <a:masterClrMapping/>
+  </p:clrMapOvr>
+</p:sld>
+</file>
+
+<file path=ppt/slides/slide21.xml><?xml version="1.0" encoding="utf-8"?>
+<p:sld xmlns:a="http://schemas.openxmlformats.org/drawingml/2006/main" xmlns:r="http://schemas.openxmlformats.org/officeDocument/2006/relationships" xmlns:p="http://schemas.openxmlformats.org/presentationml/2006/main">
+  <p:cSld>
+    <p:spTree>
+      <p:nvGrpSpPr>
+        <p:cNvPr id="1" name=""/>
+        <p:cNvGrpSpPr/>
+        <p:nvPr/>
+      </p:nvGrpSpPr>
+      <p:grpSpPr/>
+      <p:sp>
+        <p:nvSpPr>
+          <p:cNvPr id="2" name="Título 1"/>
+          <p:cNvSpPr>
+            <a:spLocks noGrp="1"/>
+          </p:cNvSpPr>
+          <p:nvPr>
+            <p:ph type="title"/>
+          </p:nvPr>
+        </p:nvSpPr>
+        <p:spPr/>
+        <p:txBody>
+          <a:bodyPr/>
+          <a:p>
+            <a:r>
+              <a:rPr lang="es-ES" altLang="en-US">
+                <a:sym typeface="+mn-ea"/>
+              </a:rPr>
+              <a:t>Angular</a:t>
+            </a:r>
+            <a:endParaRPr lang="es-ES" altLang="en-US"/>
+          </a:p>
+        </p:txBody>
+      </p:sp>
+      <p:sp>
+        <p:nvSpPr>
+          <p:cNvPr id="3" name="Marcador de posición de texto 2"/>
+          <p:cNvSpPr>
+            <a:spLocks noGrp="1"/>
+          </p:cNvSpPr>
+          <p:nvPr>
+            <p:ph type="body" sz="quarter" idx="13"/>
+          </p:nvPr>
+        </p:nvSpPr>
+        <p:spPr/>
+        <p:txBody>
+          <a:bodyPr/>
+          <a:p>
+            <a:r>
+              <a:rPr lang="es-ES" altLang="en-US"/>
+              <a:t>Practical usage</a:t>
+            </a:r>
+            <a:endParaRPr lang="es-ES" altLang="en-US"/>
+          </a:p>
+        </p:txBody>
+      </p:sp>
+      <p:sp>
+        <p:nvSpPr>
+          <p:cNvPr id="5" name="Cuadro de texto 4"/>
+          <p:cNvSpPr txBox="1"/>
+          <p:nvPr/>
+        </p:nvSpPr>
+        <p:spPr>
+          <a:xfrm>
+            <a:off x="299085" y="1575435"/>
+            <a:ext cx="7067550" cy="3784600"/>
+          </a:xfrm>
+          <a:prstGeom prst="rect">
+            <a:avLst/>
+          </a:prstGeom>
+          <a:noFill/>
+        </p:spPr>
+        <p:txBody>
+          <a:bodyPr wrap="square" rtlCol="0" anchor="t">
+            <a:spAutoFit/>
+          </a:bodyPr>
+          <a:p>
+            <a:pPr marL="342900" indent="-342900">
+              <a:buFont typeface="Arial" panose="020B0604020202020204" pitchFamily="34" charset="0"/>
+              <a:buChar char="•"/>
+            </a:pPr>
+            <a:r>
+              <a:rPr lang="es-ES" altLang="en-US"/>
+              <a:t>Listen for data from an input.</a:t>
+            </a:r>
+            <a:endParaRPr lang="es-ES" altLang="en-US"/>
+          </a:p>
+          <a:p>
+            <a:pPr marL="342900" indent="-342900">
+              <a:buFont typeface="Arial" panose="020B0604020202020204" pitchFamily="34" charset="0"/>
+              <a:buChar char="•"/>
+            </a:pPr>
+            <a:r>
+              <a:rPr lang="es-ES" altLang="en-US"/>
+              <a:t>Trim the value (remove whitespace) and make sure it’s a minimum length.</a:t>
+            </a:r>
+            <a:endParaRPr lang="es-ES" altLang="en-US"/>
+          </a:p>
+          <a:p>
+            <a:pPr marL="342900" indent="-342900">
+              <a:buFont typeface="Arial" panose="020B0604020202020204" pitchFamily="34" charset="0"/>
+              <a:buChar char="•"/>
+            </a:pPr>
+            <a:r>
+              <a:rPr lang="es-ES" altLang="en-US"/>
+              <a:t>Debounce (so as not to send off API requests for every keystroke, but instead wait for a break in keystrokes).</a:t>
+            </a:r>
+            <a:endParaRPr lang="es-ES" altLang="en-US"/>
+          </a:p>
+          <a:p>
+            <a:pPr marL="342900" indent="-342900">
+              <a:buFont typeface="Arial" panose="020B0604020202020204" pitchFamily="34" charset="0"/>
+              <a:buChar char="•"/>
+            </a:pPr>
+            <a:r>
+              <a:rPr lang="es-ES" altLang="en-US"/>
+              <a:t>Don’t send a request if the value stays the same (rapidly hit a character, then backspace, for instance).</a:t>
+            </a:r>
+            <a:endParaRPr lang="es-ES" altLang="en-US"/>
+          </a:p>
+          <a:p>
+            <a:pPr marL="342900" indent="-342900">
+              <a:buFont typeface="Arial" panose="020B0604020202020204" pitchFamily="34" charset="0"/>
+              <a:buChar char="•"/>
+            </a:pPr>
+            <a:r>
+              <a:rPr lang="es-ES" altLang="en-US"/>
+              <a:t>Cancel ongoing AJAX requests if their results will be invalidated by the updated results.</a:t>
+            </a:r>
+            <a:endParaRPr lang="es-ES" altLang="en-US"/>
+          </a:p>
+        </p:txBody>
+      </p:sp>
+    </p:spTree>
+  </p:cSld>
+  <p:clrMapOvr>
+    <a:masterClrMapping/>
+  </p:clrMapOvr>
+</p:sld>
+</file>
+
+<file path=ppt/slides/slide22.xml><?xml version="1.0" encoding="utf-8"?>
 <p:sld xmlns:a="http://schemas.openxmlformats.org/drawingml/2006/main" xmlns:r="http://schemas.openxmlformats.org/officeDocument/2006/relationships" xmlns:p="http://schemas.openxmlformats.org/presentationml/2006/main">
   <p:cSld>
     <p:bg>
@@ -7925,7 +9175,7 @@
 </p:sld>
 </file>
 
-<file path=ppt/slides/slide14.xml><?xml version="1.0" encoding="utf-8"?>
+<file path=ppt/slides/slide23.xml><?xml version="1.0" encoding="utf-8"?>
 <p:sld xmlns:a="http://schemas.openxmlformats.org/drawingml/2006/main" xmlns:r="http://schemas.openxmlformats.org/officeDocument/2006/relationships" xmlns:p="http://schemas.openxmlformats.org/presentationml/2006/main">
   <p:cSld>
     <p:spTree>
@@ -7942,206 +9192,6 @@
           <a:chExt cx="0" cy="0"/>
         </a:xfrm>
       </p:grpSpPr>
-    </p:spTree>
-  </p:cSld>
-  <p:clrMapOvr>
-    <a:masterClrMapping/>
-  </p:clrMapOvr>
-</p:sld>
-</file>
-
-<file path=ppt/slides/slide2.xml><?xml version="1.0" encoding="utf-8"?>
-<p:sld xmlns:a="http://schemas.openxmlformats.org/drawingml/2006/main" xmlns:r="http://schemas.openxmlformats.org/officeDocument/2006/relationships" xmlns:p="http://schemas.openxmlformats.org/presentationml/2006/main" showMasterSp="0">
-  <p:cSld>
-    <p:spTree>
-      <p:nvGrpSpPr>
-        <p:cNvPr id="1" name=""/>
-        <p:cNvGrpSpPr/>
-        <p:nvPr/>
-      </p:nvGrpSpPr>
-      <p:grpSpPr/>
-      <p:sp>
-        <p:nvSpPr>
-          <p:cNvPr id="2" name="Title 1"/>
-          <p:cNvSpPr>
-            <a:spLocks noGrp="1"/>
-          </p:cNvSpPr>
-          <p:nvPr>
-            <p:ph type="title"/>
-          </p:nvPr>
-        </p:nvSpPr>
-        <p:spPr>
-          <a:xfrm>
-            <a:off x="1487488" y="523903"/>
-            <a:ext cx="7584744" cy="859035"/>
-          </a:xfrm>
-        </p:spPr>
-        <p:txBody>
-          <a:bodyPr>
-            <a:normAutofit fontScale="90000"/>
-          </a:bodyPr>
-          <a:p>
-            <a:br>
-              <a:rPr lang="es-ES" altLang="en-US"/>
-            </a:br>
-            <a:endParaRPr lang="es-ES" altLang="en-US"/>
-          </a:p>
-        </p:txBody>
-      </p:sp>
-      <p:sp>
-        <p:nvSpPr>
-          <p:cNvPr id="3" name="Text Box 2"/>
-          <p:cNvSpPr txBox="1"/>
-          <p:nvPr/>
-        </p:nvSpPr>
-        <p:spPr>
-          <a:xfrm>
-            <a:off x="4169410" y="4260850"/>
-            <a:ext cx="4065270" cy="1938020"/>
-          </a:xfrm>
-          <a:prstGeom prst="rect">
-            <a:avLst/>
-          </a:prstGeom>
-          <a:noFill/>
-        </p:spPr>
-        <p:txBody>
-          <a:bodyPr wrap="square" rtlCol="0" anchor="t">
-            <a:spAutoFit/>
-          </a:bodyPr>
-          <a:p>
-            <a:pPr marL="457200" indent="-457200">
-              <a:buAutoNum type="arabicPeriod"/>
-            </a:pPr>
-            <a:r>
-              <a:rPr lang="es-ES" altLang="en-US">
-                <a:solidFill>
-                  <a:schemeClr val="bg1"/>
-                </a:solidFill>
-              </a:rPr>
-              <a:t>Best practices in Angular</a:t>
-            </a:r>
-            <a:endParaRPr lang="en-US">
-              <a:solidFill>
-                <a:schemeClr val="bg1"/>
-              </a:solidFill>
-            </a:endParaRPr>
-          </a:p>
-          <a:p>
-            <a:pPr marL="457200" indent="-457200">
-              <a:buAutoNum type="arabicPeriod"/>
-            </a:pPr>
-            <a:r>
-              <a:rPr lang="en-US">
-                <a:solidFill>
-                  <a:schemeClr val="bg1"/>
-                </a:solidFill>
-              </a:rPr>
-              <a:t>Angular CLI</a:t>
-            </a:r>
-            <a:endParaRPr lang="en-US">
-              <a:solidFill>
-                <a:schemeClr val="bg1"/>
-              </a:solidFill>
-            </a:endParaRPr>
-          </a:p>
-          <a:p>
-            <a:pPr marL="457200" indent="-457200">
-              <a:buAutoNum type="arabicPeriod"/>
-            </a:pPr>
-            <a:r>
-              <a:rPr lang="es-ES" altLang="en-US">
-                <a:solidFill>
-                  <a:schemeClr val="bg1"/>
-                </a:solidFill>
-                <a:sym typeface="+mn-ea"/>
-              </a:rPr>
-              <a:t>Automatic Documentation</a:t>
-            </a:r>
-            <a:endParaRPr lang="es-ES" altLang="en-US">
-              <a:solidFill>
-                <a:schemeClr val="bg1"/>
-              </a:solidFill>
-              <a:sym typeface="+mn-ea"/>
-            </a:endParaRPr>
-          </a:p>
-          <a:p>
-            <a:pPr marL="457200" indent="-457200">
-              <a:buAutoNum type="arabicPeriod"/>
-            </a:pPr>
-            <a:r>
-              <a:rPr lang="es-ES" altLang="en-US">
-                <a:solidFill>
-                  <a:schemeClr val="bg1"/>
-                </a:solidFill>
-              </a:rPr>
-              <a:t>Reactive Programming</a:t>
-            </a:r>
-            <a:endParaRPr lang="es-ES" altLang="en-US">
-              <a:solidFill>
-                <a:schemeClr val="bg1"/>
-              </a:solidFill>
-            </a:endParaRPr>
-          </a:p>
-          <a:p>
-            <a:pPr marL="457200" indent="-457200">
-              <a:buAutoNum type="arabicPeriod"/>
-            </a:pPr>
-            <a:endParaRPr lang="en-US">
-              <a:solidFill>
-                <a:schemeClr val="bg1"/>
-              </a:solidFill>
-            </a:endParaRPr>
-          </a:p>
-        </p:txBody>
-      </p:sp>
-      <p:pic>
-        <p:nvPicPr>
-          <p:cNvPr id="7" name="Picture 6" descr="Angular_full_color_logo.svg"/>
-          <p:cNvPicPr>
-            <a:picLocks noChangeAspect="1"/>
-          </p:cNvPicPr>
-          <p:nvPr/>
-        </p:nvPicPr>
-        <p:blipFill>
-          <a:blip r:embed="rId1"/>
-          <a:stretch>
-            <a:fillRect/>
-          </a:stretch>
-        </p:blipFill>
-        <p:spPr>
-          <a:xfrm>
-            <a:off x="3524885" y="1383030"/>
-            <a:ext cx="2529205" cy="2529205"/>
-          </a:xfrm>
-          <a:prstGeom prst="rect">
-            <a:avLst/>
-          </a:prstGeom>
-        </p:spPr>
-      </p:pic>
-      <p:pic>
-        <p:nvPicPr>
-          <p:cNvPr id="8" name="Picture 7" descr="typescript"/>
-          <p:cNvPicPr>
-            <a:picLocks noChangeAspect="1"/>
-          </p:cNvPicPr>
-          <p:nvPr/>
-        </p:nvPicPr>
-        <p:blipFill>
-          <a:blip r:embed="rId2"/>
-          <a:stretch>
-            <a:fillRect/>
-          </a:stretch>
-        </p:blipFill>
-        <p:spPr>
-          <a:xfrm>
-            <a:off x="6402070" y="1663065"/>
-            <a:ext cx="1980565" cy="1980565"/>
-          </a:xfrm>
-          <a:prstGeom prst="rect">
-            <a:avLst/>
-          </a:prstGeom>
-        </p:spPr>
-      </p:pic>
     </p:spTree>
   </p:cSld>
   <p:clrMapOvr>
@@ -9056,49 +10106,6 @@
           </a:p>
         </p:txBody>
       </p:sp>
-      <p:sp>
-        <p:nvSpPr>
-          <p:cNvPr id="4" name="Cuadro de texto 3"/>
-          <p:cNvSpPr txBox="1"/>
-          <p:nvPr/>
-        </p:nvSpPr>
-        <p:spPr>
-          <a:xfrm>
-            <a:off x="2493645" y="1876425"/>
-            <a:ext cx="6723380" cy="1198880"/>
-          </a:xfrm>
-          <a:prstGeom prst="rect">
-            <a:avLst/>
-          </a:prstGeom>
-          <a:noFill/>
-        </p:spPr>
-        <p:txBody>
-          <a:bodyPr wrap="square" rtlCol="0">
-            <a:spAutoFit/>
-          </a:bodyPr>
-          <a:p>
-            <a:r>
-              <a:rPr lang="es-ES" altLang="en-US"/>
-              <a:t>Subjetcs</a:t>
-            </a:r>
-            <a:endParaRPr lang="es-ES" altLang="en-US"/>
-          </a:p>
-          <a:p>
-            <a:r>
-              <a:rPr lang="es-ES" altLang="en-US"/>
-              <a:t>BehaviourSubcjet</a:t>
-            </a:r>
-            <a:endParaRPr lang="es-ES" altLang="en-US"/>
-          </a:p>
-          <a:p>
-            <a:r>
-              <a:rPr lang="es-ES" altLang="en-US"/>
-              <a:t>MultiCast</a:t>
-            </a:r>
-            <a:endParaRPr lang="es-ES" altLang="en-US"/>
-          </a:p>
-        </p:txBody>
-      </p:sp>
       <p:pic>
         <p:nvPicPr>
           <p:cNvPr id="6" name="Imagen 5" descr="subjectjpeg"/>
@@ -9115,7 +10122,7 @@
         </p:blipFill>
         <p:spPr>
           <a:xfrm>
-            <a:off x="5666740" y="1876425"/>
+            <a:off x="5379085" y="3104515"/>
             <a:ext cx="5799455" cy="2446020"/>
           </a:xfrm>
           <a:prstGeom prst="rect">
@@ -9123,6 +10130,35 @@
           </a:prstGeom>
         </p:spPr>
       </p:pic>
+      <p:sp>
+        <p:nvSpPr>
+          <p:cNvPr id="5" name="Cuadro de texto 4"/>
+          <p:cNvSpPr txBox="1"/>
+          <p:nvPr/>
+        </p:nvSpPr>
+        <p:spPr>
+          <a:xfrm>
+            <a:off x="299085" y="1690370"/>
+            <a:ext cx="5919470" cy="1568450"/>
+          </a:xfrm>
+          <a:prstGeom prst="rect">
+            <a:avLst/>
+          </a:prstGeom>
+          <a:noFill/>
+        </p:spPr>
+        <p:txBody>
+          <a:bodyPr wrap="square" rtlCol="0" anchor="t">
+            <a:spAutoFit/>
+          </a:bodyPr>
+          <a:p>
+            <a:r>
+              <a:rPr lang="es-ES" altLang="en-US"/>
+              <a:t>A Subject is like an Observable, but can multicast to many Observers. Subjects are like EventEmitters: they maintain a registry of many listeners.</a:t>
+            </a:r>
+            <a:endParaRPr lang="es-ES" altLang="en-US"/>
+          </a:p>
+        </p:txBody>
+      </p:sp>
     </p:spTree>
   </p:cSld>
   <p:clrMapOvr>

</xml_diff>